<commit_message>
June 15th last update
</commit_message>
<xml_diff>
--- a/design.pptx
+++ b/design.pptx
@@ -5,8 +5,9 @@
     <p:sldMasterId id="2147483648" r:id="rId1"/>
   </p:sldMasterIdLst>
   <p:sldIdLst>
-    <p:sldId id="333" r:id="rId2"/>
-    <p:sldId id="332" r:id="rId3"/>
+    <p:sldId id="335" r:id="rId2"/>
+    <p:sldId id="333" r:id="rId3"/>
+    <p:sldId id="332" r:id="rId4"/>
   </p:sldIdLst>
   <p:sldSz cx="12192000" cy="6858000"/>
   <p:notesSz cx="6858000" cy="9144000"/>
@@ -105,6 +106,11 @@
       </a:defRPr>
     </a:lvl9pPr>
   </p:defaultTextStyle>
+  <p:extLst>
+    <p:ext uri="{EFAFB233-063F-42B5-8137-9DF3F51BA10A}">
+      <p15:sldGuideLst xmlns:p15="http://schemas.microsoft.com/office/powerpoint/2012/main"/>
+    </p:ext>
+  </p:extLst>
 </p:presentation>
 </file>
 
@@ -3324,6 +3330,752 @@
       </p:grpSpPr>
       <p:sp>
         <p:nvSpPr>
+          <p:cNvPr id="4" name="TextBox 3">
+            <a:extLst>
+              <a:ext uri="{FF2B5EF4-FFF2-40B4-BE49-F238E27FC236}">
+                <a16:creationId xmlns:a16="http://schemas.microsoft.com/office/drawing/2014/main" id="{CD14A3C1-07CC-7901-3663-83497516398F}"/>
+              </a:ext>
+            </a:extLst>
+          </p:cNvPr>
+          <p:cNvSpPr txBox="1"/>
+          <p:nvPr/>
+        </p:nvSpPr>
+        <p:spPr>
+          <a:xfrm>
+            <a:off x="238462" y="203002"/>
+            <a:ext cx="724878" cy="338554"/>
+          </a:xfrm>
+          <a:prstGeom prst="rect">
+            <a:avLst/>
+          </a:prstGeom>
+          <a:noFill/>
+        </p:spPr>
+        <p:txBody>
+          <a:bodyPr wrap="none" rtlCol="0">
+            <a:spAutoFit/>
+          </a:bodyPr>
+          <a:lstStyle/>
+          <a:p>
+            <a:r>
+              <a:rPr lang="en-US" sz="1600" dirty="0"/>
+              <a:t>Model</a:t>
+            </a:r>
+          </a:p>
+        </p:txBody>
+      </p:sp>
+      <p:sp>
+        <p:nvSpPr>
+          <p:cNvPr id="5" name="TextBox 4">
+            <a:extLst>
+              <a:ext uri="{FF2B5EF4-FFF2-40B4-BE49-F238E27FC236}">
+                <a16:creationId xmlns:a16="http://schemas.microsoft.com/office/drawing/2014/main" id="{A1F35CE4-AC69-0F87-559C-40B41FB59E1E}"/>
+              </a:ext>
+            </a:extLst>
+          </p:cNvPr>
+          <p:cNvSpPr txBox="1"/>
+          <p:nvPr/>
+        </p:nvSpPr>
+        <p:spPr>
+          <a:xfrm>
+            <a:off x="238462" y="591713"/>
+            <a:ext cx="2190215" cy="1569660"/>
+          </a:xfrm>
+          <a:prstGeom prst="rect">
+            <a:avLst/>
+          </a:prstGeom>
+          <a:noFill/>
+        </p:spPr>
+        <p:txBody>
+          <a:bodyPr wrap="none" rtlCol="0">
+            <a:spAutoFit/>
+          </a:bodyPr>
+          <a:lstStyle/>
+          <a:p>
+            <a:pPr marL="285750" indent="-285750">
+              <a:buFontTx/>
+              <a:buChar char="-"/>
+            </a:pPr>
+            <a:r>
+              <a:rPr lang="en-US" sz="1600" dirty="0"/>
+              <a:t>name: string</a:t>
+            </a:r>
+          </a:p>
+          <a:p>
+            <a:pPr marL="285750" indent="-285750">
+              <a:buFontTx/>
+              <a:buChar char="-"/>
+            </a:pPr>
+            <a:r>
+              <a:rPr lang="en-US" altLang="zh-CN" sz="1600" dirty="0" err="1"/>
+              <a:t>employee_id</a:t>
+            </a:r>
+            <a:r>
+              <a:rPr lang="en-US" sz="1600" dirty="0"/>
+              <a:t>: int</a:t>
+            </a:r>
+          </a:p>
+          <a:p>
+            <a:pPr marL="285750" indent="-285750">
+              <a:buFontTx/>
+              <a:buChar char="-"/>
+            </a:pPr>
+            <a:r>
+              <a:rPr lang="en-US" sz="1600" dirty="0"/>
+              <a:t>title: string</a:t>
+            </a:r>
+          </a:p>
+          <a:p>
+            <a:pPr marL="285750" indent="-285750">
+              <a:buFontTx/>
+              <a:buChar char="-"/>
+            </a:pPr>
+            <a:r>
+              <a:rPr lang="en-US" sz="1600" dirty="0" err="1"/>
+              <a:t>handling_level</a:t>
+            </a:r>
+            <a:r>
+              <a:rPr lang="en-US" sz="1600" dirty="0"/>
+              <a:t>: int</a:t>
+            </a:r>
+          </a:p>
+          <a:p>
+            <a:pPr marL="285750" indent="-285750">
+              <a:buFontTx/>
+              <a:buChar char="-"/>
+            </a:pPr>
+            <a:r>
+              <a:rPr lang="en-US" sz="1600" dirty="0" err="1"/>
+              <a:t>free_status</a:t>
+            </a:r>
+            <a:r>
+              <a:rPr lang="en-US" sz="1600" dirty="0"/>
+              <a:t>: </a:t>
+            </a:r>
+            <a:r>
+              <a:rPr lang="en-US" sz="1600" dirty="0" err="1"/>
+              <a:t>boolean</a:t>
+            </a:r>
+            <a:endParaRPr lang="en-US" sz="1600" dirty="0"/>
+          </a:p>
+          <a:p>
+            <a:pPr marL="285750" indent="-285750">
+              <a:buFontTx/>
+              <a:buChar char="-"/>
+            </a:pPr>
+            <a:r>
+              <a:rPr lang="en-US" sz="1600" dirty="0"/>
+              <a:t>call: Call</a:t>
+            </a:r>
+          </a:p>
+        </p:txBody>
+      </p:sp>
+      <p:grpSp>
+        <p:nvGrpSpPr>
+          <p:cNvPr id="8" name="Group 7">
+            <a:extLst>
+              <a:ext uri="{FF2B5EF4-FFF2-40B4-BE49-F238E27FC236}">
+                <a16:creationId xmlns:a16="http://schemas.microsoft.com/office/drawing/2014/main" id="{751B3CF7-4A04-6C99-66AD-CF4F7995E337}"/>
+              </a:ext>
+            </a:extLst>
+          </p:cNvPr>
+          <p:cNvGrpSpPr/>
+          <p:nvPr/>
+        </p:nvGrpSpPr>
+        <p:grpSpPr>
+          <a:xfrm>
+            <a:off x="114675" y="203002"/>
+            <a:ext cx="3008226" cy="2966993"/>
+            <a:chOff x="483164" y="953629"/>
+            <a:chExt cx="3008226" cy="2966993"/>
+          </a:xfrm>
+        </p:grpSpPr>
+        <p:sp>
+          <p:nvSpPr>
+            <p:cNvPr id="2" name="Rectangle 1">
+              <a:extLst>
+                <a:ext uri="{FF2B5EF4-FFF2-40B4-BE49-F238E27FC236}">
+                  <a16:creationId xmlns:a16="http://schemas.microsoft.com/office/drawing/2014/main" id="{45FF2032-1E08-AD73-81FD-74BCF82FAD7D}"/>
+                </a:ext>
+              </a:extLst>
+            </p:cNvPr>
+            <p:cNvSpPr/>
+            <p:nvPr/>
+          </p:nvSpPr>
+          <p:spPr>
+            <a:xfrm>
+              <a:off x="483166" y="953629"/>
+              <a:ext cx="3008224" cy="2966993"/>
+            </a:xfrm>
+            <a:prstGeom prst="rect">
+              <a:avLst/>
+            </a:prstGeom>
+            <a:noFill/>
+            <a:ln>
+              <a:solidFill>
+                <a:schemeClr val="tx1"/>
+              </a:solidFill>
+            </a:ln>
+          </p:spPr>
+          <p:style>
+            <a:lnRef idx="2">
+              <a:schemeClr val="accent1">
+                <a:shade val="50000"/>
+              </a:schemeClr>
+            </a:lnRef>
+            <a:fillRef idx="1">
+              <a:schemeClr val="accent1"/>
+            </a:fillRef>
+            <a:effectRef idx="0">
+              <a:schemeClr val="accent1"/>
+            </a:effectRef>
+            <a:fontRef idx="minor">
+              <a:schemeClr val="lt1"/>
+            </a:fontRef>
+          </p:style>
+          <p:txBody>
+            <a:bodyPr rtlCol="0" anchor="ctr"/>
+            <a:lstStyle/>
+            <a:p>
+              <a:endParaRPr lang="en-US" sz="1600" dirty="0">
+                <a:solidFill>
+                  <a:schemeClr val="tx1"/>
+                </a:solidFill>
+              </a:endParaRPr>
+            </a:p>
+          </p:txBody>
+        </p:sp>
+        <p:cxnSp>
+          <p:nvCxnSpPr>
+            <p:cNvPr id="3" name="Straight Connector 2">
+              <a:extLst>
+                <a:ext uri="{FF2B5EF4-FFF2-40B4-BE49-F238E27FC236}">
+                  <a16:creationId xmlns:a16="http://schemas.microsoft.com/office/drawing/2014/main" id="{58B748BD-1246-BA82-00DB-1EAF11CE58F9}"/>
+                </a:ext>
+              </a:extLst>
+            </p:cNvPr>
+            <p:cNvCxnSpPr>
+              <a:cxnSpLocks/>
+            </p:cNvCxnSpPr>
+            <p:nvPr/>
+          </p:nvCxnSpPr>
+          <p:spPr>
+            <a:xfrm>
+              <a:off x="483165" y="1292183"/>
+              <a:ext cx="3008225" cy="0"/>
+            </a:xfrm>
+            <a:prstGeom prst="line">
+              <a:avLst/>
+            </a:prstGeom>
+            <a:ln>
+              <a:solidFill>
+                <a:schemeClr val="tx1"/>
+              </a:solidFill>
+            </a:ln>
+          </p:spPr>
+          <p:style>
+            <a:lnRef idx="1">
+              <a:schemeClr val="accent1"/>
+            </a:lnRef>
+            <a:fillRef idx="0">
+              <a:schemeClr val="accent1"/>
+            </a:fillRef>
+            <a:effectRef idx="0">
+              <a:schemeClr val="accent1"/>
+            </a:effectRef>
+            <a:fontRef idx="minor">
+              <a:schemeClr val="tx1"/>
+            </a:fontRef>
+          </p:style>
+        </p:cxnSp>
+        <p:cxnSp>
+          <p:nvCxnSpPr>
+            <p:cNvPr id="6" name="Straight Connector 5">
+              <a:extLst>
+                <a:ext uri="{FF2B5EF4-FFF2-40B4-BE49-F238E27FC236}">
+                  <a16:creationId xmlns:a16="http://schemas.microsoft.com/office/drawing/2014/main" id="{0CB1B1B2-8F10-4CDF-B9DB-C6C5197FAAA9}"/>
+                </a:ext>
+              </a:extLst>
+            </p:cNvPr>
+            <p:cNvCxnSpPr>
+              <a:cxnSpLocks/>
+            </p:cNvCxnSpPr>
+            <p:nvPr/>
+          </p:nvCxnSpPr>
+          <p:spPr>
+            <a:xfrm>
+              <a:off x="483164" y="2965718"/>
+              <a:ext cx="3008225" cy="0"/>
+            </a:xfrm>
+            <a:prstGeom prst="line">
+              <a:avLst/>
+            </a:prstGeom>
+            <a:ln>
+              <a:solidFill>
+                <a:schemeClr val="tx1"/>
+              </a:solidFill>
+            </a:ln>
+          </p:spPr>
+          <p:style>
+            <a:lnRef idx="1">
+              <a:schemeClr val="accent1"/>
+            </a:lnRef>
+            <a:fillRef idx="0">
+              <a:schemeClr val="accent1"/>
+            </a:fillRef>
+            <a:effectRef idx="0">
+              <a:schemeClr val="accent1"/>
+            </a:effectRef>
+            <a:fontRef idx="minor">
+              <a:schemeClr val="tx1"/>
+            </a:fontRef>
+          </p:style>
+        </p:cxnSp>
+      </p:grpSp>
+      <p:sp>
+        <p:nvSpPr>
+          <p:cNvPr id="7" name="TextBox 6">
+            <a:extLst>
+              <a:ext uri="{FF2B5EF4-FFF2-40B4-BE49-F238E27FC236}">
+                <a16:creationId xmlns:a16="http://schemas.microsoft.com/office/drawing/2014/main" id="{669EDC64-E759-43B0-C324-A1659C0660DA}"/>
+              </a:ext>
+            </a:extLst>
+          </p:cNvPr>
+          <p:cNvSpPr txBox="1"/>
+          <p:nvPr/>
+        </p:nvSpPr>
+        <p:spPr>
+          <a:xfrm>
+            <a:off x="208472" y="2247404"/>
+            <a:ext cx="2391745" cy="830997"/>
+          </a:xfrm>
+          <a:prstGeom prst="rect">
+            <a:avLst/>
+          </a:prstGeom>
+          <a:noFill/>
+        </p:spPr>
+        <p:txBody>
+          <a:bodyPr wrap="none" rtlCol="0">
+            <a:spAutoFit/>
+          </a:bodyPr>
+          <a:lstStyle/>
+          <a:p>
+            <a:r>
+              <a:rPr lang="en-US" sz="1600" dirty="0"/>
+              <a:t>+    </a:t>
+            </a:r>
+            <a:r>
+              <a:rPr lang="en-US" sz="1600" dirty="0" err="1"/>
+              <a:t>check_types</a:t>
+            </a:r>
+            <a:r>
+              <a:rPr lang="en-US" sz="1600" dirty="0"/>
+              <a:t>(): None</a:t>
+            </a:r>
+          </a:p>
+          <a:p>
+            <a:r>
+              <a:rPr lang="en-US" sz="1600" dirty="0"/>
+              <a:t>+    </a:t>
+            </a:r>
+            <a:r>
+              <a:rPr lang="en-US" sz="1600" dirty="0" err="1"/>
+              <a:t>process_call</a:t>
+            </a:r>
+            <a:r>
+              <a:rPr lang="en-US" sz="1600" dirty="0"/>
+              <a:t>(): </a:t>
+            </a:r>
+            <a:r>
+              <a:rPr lang="en-US" sz="1600" dirty="0" err="1"/>
+              <a:t>boolean</a:t>
+            </a:r>
+            <a:endParaRPr lang="en-US" sz="1600" dirty="0"/>
+          </a:p>
+          <a:p>
+            <a:r>
+              <a:rPr lang="en-US" sz="1600" dirty="0"/>
+              <a:t>+    </a:t>
+            </a:r>
+            <a:r>
+              <a:rPr lang="en-US" sz="1600" dirty="0" err="1"/>
+              <a:t>finish_call</a:t>
+            </a:r>
+            <a:r>
+              <a:rPr lang="en-US" sz="1600" dirty="0"/>
+              <a:t>(): None</a:t>
+            </a:r>
+          </a:p>
+        </p:txBody>
+      </p:sp>
+      <p:sp>
+        <p:nvSpPr>
+          <p:cNvPr id="13" name="TextBox 12">
+            <a:extLst>
+              <a:ext uri="{FF2B5EF4-FFF2-40B4-BE49-F238E27FC236}">
+                <a16:creationId xmlns:a16="http://schemas.microsoft.com/office/drawing/2014/main" id="{5AB3D25A-5F20-3F6C-FA56-837200EAB5A7}"/>
+              </a:ext>
+            </a:extLst>
+          </p:cNvPr>
+          <p:cNvSpPr txBox="1"/>
+          <p:nvPr/>
+        </p:nvSpPr>
+        <p:spPr>
+          <a:xfrm>
+            <a:off x="4060691" y="953629"/>
+            <a:ext cx="1763624" cy="338554"/>
+          </a:xfrm>
+          <a:prstGeom prst="rect">
+            <a:avLst/>
+          </a:prstGeom>
+          <a:noFill/>
+        </p:spPr>
+        <p:txBody>
+          <a:bodyPr wrap="none" rtlCol="0">
+            <a:spAutoFit/>
+          </a:bodyPr>
+          <a:lstStyle/>
+          <a:p>
+            <a:r>
+              <a:rPr lang="en-US" sz="1600" dirty="0" err="1"/>
+              <a:t>EndMemberModel</a:t>
+            </a:r>
+            <a:endParaRPr lang="en-US" sz="1600" dirty="0"/>
+          </a:p>
+        </p:txBody>
+      </p:sp>
+      <p:sp>
+        <p:nvSpPr>
+          <p:cNvPr id="14" name="TextBox 13">
+            <a:extLst>
+              <a:ext uri="{FF2B5EF4-FFF2-40B4-BE49-F238E27FC236}">
+                <a16:creationId xmlns:a16="http://schemas.microsoft.com/office/drawing/2014/main" id="{3C9EF4A9-E5F4-7B19-78E1-8168CC1B1E77}"/>
+              </a:ext>
+            </a:extLst>
+          </p:cNvPr>
+          <p:cNvSpPr txBox="1"/>
+          <p:nvPr/>
+        </p:nvSpPr>
+        <p:spPr>
+          <a:xfrm>
+            <a:off x="4060691" y="1342340"/>
+            <a:ext cx="1714828" cy="1077218"/>
+          </a:xfrm>
+          <a:prstGeom prst="rect">
+            <a:avLst/>
+          </a:prstGeom>
+          <a:noFill/>
+        </p:spPr>
+        <p:txBody>
+          <a:bodyPr wrap="none" rtlCol="0">
+            <a:spAutoFit/>
+          </a:bodyPr>
+          <a:lstStyle/>
+          <a:p>
+            <a:pPr marL="285750" indent="-285750">
+              <a:buFontTx/>
+              <a:buChar char="-"/>
+            </a:pPr>
+            <a:r>
+              <a:rPr lang="en-US" sz="1600" dirty="0" err="1"/>
+              <a:t>diffusion_coef</a:t>
+            </a:r>
+            <a:r>
+              <a:rPr lang="en-US" sz="1600" dirty="0"/>
+              <a:t>:</a:t>
+            </a:r>
+          </a:p>
+          <a:p>
+            <a:pPr marL="285750" indent="-285750">
+              <a:buFontTx/>
+              <a:buChar char="-"/>
+            </a:pPr>
+            <a:r>
+              <a:rPr lang="en-US" sz="1600" dirty="0" err="1"/>
+              <a:t>temp_celsius</a:t>
+            </a:r>
+            <a:r>
+              <a:rPr lang="en-US" sz="1600" dirty="0"/>
+              <a:t>:</a:t>
+            </a:r>
+          </a:p>
+          <a:p>
+            <a:pPr marL="285750" indent="-285750">
+              <a:buFontTx/>
+              <a:buChar char="-"/>
+            </a:pPr>
+            <a:r>
+              <a:rPr lang="en-US" sz="1600" dirty="0" err="1"/>
+              <a:t>pre_factor</a:t>
+            </a:r>
+            <a:r>
+              <a:rPr lang="en-US" sz="1600" dirty="0"/>
+              <a:t>:</a:t>
+            </a:r>
+          </a:p>
+          <a:p>
+            <a:pPr marL="285750" indent="-285750">
+              <a:buFontTx/>
+              <a:buChar char="-"/>
+            </a:pPr>
+            <a:r>
+              <a:rPr lang="en-US" sz="1600" dirty="0" err="1"/>
+              <a:t>activ_energy</a:t>
+            </a:r>
+            <a:r>
+              <a:rPr lang="en-US" sz="1600" dirty="0"/>
+              <a:t>:</a:t>
+            </a:r>
+          </a:p>
+        </p:txBody>
+      </p:sp>
+      <p:grpSp>
+        <p:nvGrpSpPr>
+          <p:cNvPr id="15" name="Group 14">
+            <a:extLst>
+              <a:ext uri="{FF2B5EF4-FFF2-40B4-BE49-F238E27FC236}">
+                <a16:creationId xmlns:a16="http://schemas.microsoft.com/office/drawing/2014/main" id="{676E0186-1077-C04C-EEB1-4DBAC14A3373}"/>
+              </a:ext>
+            </a:extLst>
+          </p:cNvPr>
+          <p:cNvGrpSpPr/>
+          <p:nvPr/>
+        </p:nvGrpSpPr>
+        <p:grpSpPr>
+          <a:xfrm>
+            <a:off x="3936904" y="953629"/>
+            <a:ext cx="3008226" cy="2966993"/>
+            <a:chOff x="483164" y="953629"/>
+            <a:chExt cx="3008226" cy="2966993"/>
+          </a:xfrm>
+        </p:grpSpPr>
+        <p:sp>
+          <p:nvSpPr>
+            <p:cNvPr id="16" name="Rectangle 15">
+              <a:extLst>
+                <a:ext uri="{FF2B5EF4-FFF2-40B4-BE49-F238E27FC236}">
+                  <a16:creationId xmlns:a16="http://schemas.microsoft.com/office/drawing/2014/main" id="{AF8DE215-F5A0-1013-B641-6BF90706F58D}"/>
+                </a:ext>
+              </a:extLst>
+            </p:cNvPr>
+            <p:cNvSpPr/>
+            <p:nvPr/>
+          </p:nvSpPr>
+          <p:spPr>
+            <a:xfrm>
+              <a:off x="483166" y="953629"/>
+              <a:ext cx="3008224" cy="2966993"/>
+            </a:xfrm>
+            <a:prstGeom prst="rect">
+              <a:avLst/>
+            </a:prstGeom>
+            <a:noFill/>
+            <a:ln>
+              <a:solidFill>
+                <a:schemeClr val="tx1"/>
+              </a:solidFill>
+            </a:ln>
+          </p:spPr>
+          <p:style>
+            <a:lnRef idx="2">
+              <a:schemeClr val="accent1">
+                <a:shade val="50000"/>
+              </a:schemeClr>
+            </a:lnRef>
+            <a:fillRef idx="1">
+              <a:schemeClr val="accent1"/>
+            </a:fillRef>
+            <a:effectRef idx="0">
+              <a:schemeClr val="accent1"/>
+            </a:effectRef>
+            <a:fontRef idx="minor">
+              <a:schemeClr val="lt1"/>
+            </a:fontRef>
+          </p:style>
+          <p:txBody>
+            <a:bodyPr rtlCol="0" anchor="ctr"/>
+            <a:lstStyle/>
+            <a:p>
+              <a:endParaRPr lang="en-US" sz="1600" dirty="0">
+                <a:solidFill>
+                  <a:schemeClr val="tx1"/>
+                </a:solidFill>
+              </a:endParaRPr>
+            </a:p>
+          </p:txBody>
+        </p:sp>
+        <p:cxnSp>
+          <p:nvCxnSpPr>
+            <p:cNvPr id="17" name="Straight Connector 16">
+              <a:extLst>
+                <a:ext uri="{FF2B5EF4-FFF2-40B4-BE49-F238E27FC236}">
+                  <a16:creationId xmlns:a16="http://schemas.microsoft.com/office/drawing/2014/main" id="{C26A0296-5346-CEF1-A823-9F4980D18384}"/>
+                </a:ext>
+              </a:extLst>
+            </p:cNvPr>
+            <p:cNvCxnSpPr>
+              <a:cxnSpLocks/>
+            </p:cNvCxnSpPr>
+            <p:nvPr/>
+          </p:nvCxnSpPr>
+          <p:spPr>
+            <a:xfrm>
+              <a:off x="483165" y="1292183"/>
+              <a:ext cx="3008225" cy="0"/>
+            </a:xfrm>
+            <a:prstGeom prst="line">
+              <a:avLst/>
+            </a:prstGeom>
+            <a:ln>
+              <a:solidFill>
+                <a:schemeClr val="tx1"/>
+              </a:solidFill>
+            </a:ln>
+          </p:spPr>
+          <p:style>
+            <a:lnRef idx="1">
+              <a:schemeClr val="accent1"/>
+            </a:lnRef>
+            <a:fillRef idx="0">
+              <a:schemeClr val="accent1"/>
+            </a:fillRef>
+            <a:effectRef idx="0">
+              <a:schemeClr val="accent1"/>
+            </a:effectRef>
+            <a:fontRef idx="minor">
+              <a:schemeClr val="tx1"/>
+            </a:fontRef>
+          </p:style>
+        </p:cxnSp>
+        <p:cxnSp>
+          <p:nvCxnSpPr>
+            <p:cNvPr id="18" name="Straight Connector 17">
+              <a:extLst>
+                <a:ext uri="{FF2B5EF4-FFF2-40B4-BE49-F238E27FC236}">
+                  <a16:creationId xmlns:a16="http://schemas.microsoft.com/office/drawing/2014/main" id="{15ECCF40-6BF8-5B9C-A0D7-37F922A2C6D6}"/>
+                </a:ext>
+              </a:extLst>
+            </p:cNvPr>
+            <p:cNvCxnSpPr>
+              <a:cxnSpLocks/>
+            </p:cNvCxnSpPr>
+            <p:nvPr/>
+          </p:nvCxnSpPr>
+          <p:spPr>
+            <a:xfrm>
+              <a:off x="483164" y="2965718"/>
+              <a:ext cx="3008225" cy="0"/>
+            </a:xfrm>
+            <a:prstGeom prst="line">
+              <a:avLst/>
+            </a:prstGeom>
+            <a:ln>
+              <a:solidFill>
+                <a:schemeClr val="tx1"/>
+              </a:solidFill>
+            </a:ln>
+          </p:spPr>
+          <p:style>
+            <a:lnRef idx="1">
+              <a:schemeClr val="accent1"/>
+            </a:lnRef>
+            <a:fillRef idx="0">
+              <a:schemeClr val="accent1"/>
+            </a:fillRef>
+            <a:effectRef idx="0">
+              <a:schemeClr val="accent1"/>
+            </a:effectRef>
+            <a:fontRef idx="minor">
+              <a:schemeClr val="tx1"/>
+            </a:fontRef>
+          </p:style>
+        </p:cxnSp>
+      </p:grpSp>
+      <p:sp>
+        <p:nvSpPr>
+          <p:cNvPr id="19" name="TextBox 18">
+            <a:extLst>
+              <a:ext uri="{FF2B5EF4-FFF2-40B4-BE49-F238E27FC236}">
+                <a16:creationId xmlns:a16="http://schemas.microsoft.com/office/drawing/2014/main" id="{0821D6DE-89C9-5A61-A80D-F084A333F227}"/>
+              </a:ext>
+            </a:extLst>
+          </p:cNvPr>
+          <p:cNvSpPr txBox="1"/>
+          <p:nvPr/>
+        </p:nvSpPr>
+        <p:spPr>
+          <a:xfrm>
+            <a:off x="4030701" y="2998031"/>
+            <a:ext cx="1982017" cy="584775"/>
+          </a:xfrm>
+          <a:prstGeom prst="rect">
+            <a:avLst/>
+          </a:prstGeom>
+          <a:noFill/>
+        </p:spPr>
+        <p:txBody>
+          <a:bodyPr wrap="none" rtlCol="0">
+            <a:spAutoFit/>
+          </a:bodyPr>
+          <a:lstStyle/>
+          <a:p>
+            <a:r>
+              <a:rPr lang="en-US" sz="1600" dirty="0"/>
+              <a:t>+    </a:t>
+            </a:r>
+            <a:r>
+              <a:rPr lang="en-US" sz="1600" dirty="0" err="1"/>
+              <a:t>load_data</a:t>
+            </a:r>
+            <a:r>
+              <a:rPr lang="en-US" sz="1600" dirty="0"/>
+              <a:t>(): None</a:t>
+            </a:r>
+          </a:p>
+          <a:p>
+            <a:r>
+              <a:rPr lang="en-US" sz="1600" dirty="0"/>
+              <a:t>+    fitting(): </a:t>
+            </a:r>
+            <a:r>
+              <a:rPr lang="en-US" sz="1600" dirty="0" err="1"/>
+              <a:t>boolean</a:t>
+            </a:r>
+            <a:endParaRPr lang="en-US" sz="1600" dirty="0"/>
+          </a:p>
+        </p:txBody>
+      </p:sp>
+    </p:spTree>
+    <p:extLst>
+      <p:ext uri="{BB962C8B-B14F-4D97-AF65-F5344CB8AC3E}">
+        <p14:creationId xmlns:p14="http://schemas.microsoft.com/office/powerpoint/2010/main" val="3032212538"/>
+      </p:ext>
+    </p:extLst>
+  </p:cSld>
+  <p:clrMapOvr>
+    <a:masterClrMapping/>
+  </p:clrMapOvr>
+</p:sld>
+</file>
+
+<file path=ppt/slides/slide2.xml><?xml version="1.0" encoding="utf-8"?>
+<p:sld xmlns:a="http://schemas.openxmlformats.org/drawingml/2006/main" xmlns:r="http://schemas.openxmlformats.org/officeDocument/2006/relationships" xmlns:p="http://schemas.openxmlformats.org/presentationml/2006/main">
+  <p:cSld>
+    <p:spTree>
+      <p:nvGrpSpPr>
+        <p:cNvPr id="1" name=""/>
+        <p:cNvGrpSpPr/>
+        <p:nvPr/>
+      </p:nvGrpSpPr>
+      <p:grpSpPr>
+        <a:xfrm>
+          <a:off x="0" y="0"/>
+          <a:ext cx="0" cy="0"/>
+          <a:chOff x="0" y="0"/>
+          <a:chExt cx="0" cy="0"/>
+        </a:xfrm>
+      </p:grpSpPr>
+      <p:sp>
+        <p:nvSpPr>
           <p:cNvPr id="4" name="Rectangle 3">
             <a:extLst>
               <a:ext uri="{FF2B5EF4-FFF2-40B4-BE49-F238E27FC236}">
@@ -3832,7 +4584,7 @@
 </p:sld>
 </file>
 
-<file path=ppt/slides/slide2.xml><?xml version="1.0" encoding="utf-8"?>
+<file path=ppt/slides/slide3.xml><?xml version="1.0" encoding="utf-8"?>
 <p:sld xmlns:a="http://schemas.openxmlformats.org/drawingml/2006/main" xmlns:r="http://schemas.openxmlformats.org/officeDocument/2006/relationships" xmlns:p="http://schemas.openxmlformats.org/presentationml/2006/main">
   <p:cSld>
     <p:spTree>

</xml_diff>

<commit_message>
Optimize checked! It is correct!
</commit_message>
<xml_diff>
--- a/design.pptx
+++ b/design.pptx
@@ -261,7 +261,7 @@
           <a:p>
             <a:fld id="{B4CC5DF7-ECFD-4A94-9147-F3E6D3B8603D}" type="datetimeFigureOut">
               <a:rPr lang="en-US" smtClean="0"/>
-              <a:t>6/15/2023</a:t>
+              <a:t>7/5/2023</a:t>
             </a:fld>
             <a:endParaRPr lang="en-US"/>
           </a:p>
@@ -459,7 +459,7 @@
           <a:p>
             <a:fld id="{B4CC5DF7-ECFD-4A94-9147-F3E6D3B8603D}" type="datetimeFigureOut">
               <a:rPr lang="en-US" smtClean="0"/>
-              <a:t>6/15/2023</a:t>
+              <a:t>7/5/2023</a:t>
             </a:fld>
             <a:endParaRPr lang="en-US"/>
           </a:p>
@@ -667,7 +667,7 @@
           <a:p>
             <a:fld id="{B4CC5DF7-ECFD-4A94-9147-F3E6D3B8603D}" type="datetimeFigureOut">
               <a:rPr lang="en-US" smtClean="0"/>
-              <a:t>6/15/2023</a:t>
+              <a:t>7/5/2023</a:t>
             </a:fld>
             <a:endParaRPr lang="en-US"/>
           </a:p>
@@ -865,7 +865,7 @@
           <a:p>
             <a:fld id="{B4CC5DF7-ECFD-4A94-9147-F3E6D3B8603D}" type="datetimeFigureOut">
               <a:rPr lang="en-US" smtClean="0"/>
-              <a:t>6/15/2023</a:t>
+              <a:t>7/5/2023</a:t>
             </a:fld>
             <a:endParaRPr lang="en-US"/>
           </a:p>
@@ -1140,7 +1140,7 @@
           <a:p>
             <a:fld id="{B4CC5DF7-ECFD-4A94-9147-F3E6D3B8603D}" type="datetimeFigureOut">
               <a:rPr lang="en-US" smtClean="0"/>
-              <a:t>6/15/2023</a:t>
+              <a:t>7/5/2023</a:t>
             </a:fld>
             <a:endParaRPr lang="en-US"/>
           </a:p>
@@ -1405,7 +1405,7 @@
           <a:p>
             <a:fld id="{B4CC5DF7-ECFD-4A94-9147-F3E6D3B8603D}" type="datetimeFigureOut">
               <a:rPr lang="en-US" smtClean="0"/>
-              <a:t>6/15/2023</a:t>
+              <a:t>7/5/2023</a:t>
             </a:fld>
             <a:endParaRPr lang="en-US"/>
           </a:p>
@@ -1817,7 +1817,7 @@
           <a:p>
             <a:fld id="{B4CC5DF7-ECFD-4A94-9147-F3E6D3B8603D}" type="datetimeFigureOut">
               <a:rPr lang="en-US" smtClean="0"/>
-              <a:t>6/15/2023</a:t>
+              <a:t>7/5/2023</a:t>
             </a:fld>
             <a:endParaRPr lang="en-US"/>
           </a:p>
@@ -1958,7 +1958,7 @@
           <a:p>
             <a:fld id="{B4CC5DF7-ECFD-4A94-9147-F3E6D3B8603D}" type="datetimeFigureOut">
               <a:rPr lang="en-US" smtClean="0"/>
-              <a:t>6/15/2023</a:t>
+              <a:t>7/5/2023</a:t>
             </a:fld>
             <a:endParaRPr lang="en-US"/>
           </a:p>
@@ -2071,7 +2071,7 @@
           <a:p>
             <a:fld id="{B4CC5DF7-ECFD-4A94-9147-F3E6D3B8603D}" type="datetimeFigureOut">
               <a:rPr lang="en-US" smtClean="0"/>
-              <a:t>6/15/2023</a:t>
+              <a:t>7/5/2023</a:t>
             </a:fld>
             <a:endParaRPr lang="en-US"/>
           </a:p>
@@ -2382,7 +2382,7 @@
           <a:p>
             <a:fld id="{B4CC5DF7-ECFD-4A94-9147-F3E6D3B8603D}" type="datetimeFigureOut">
               <a:rPr lang="en-US" smtClean="0"/>
-              <a:t>6/15/2023</a:t>
+              <a:t>7/5/2023</a:t>
             </a:fld>
             <a:endParaRPr lang="en-US"/>
           </a:p>
@@ -2670,7 +2670,7 @@
           <a:p>
             <a:fld id="{B4CC5DF7-ECFD-4A94-9147-F3E6D3B8603D}" type="datetimeFigureOut">
               <a:rPr lang="en-US" smtClean="0"/>
-              <a:t>6/15/2023</a:t>
+              <a:t>7/5/2023</a:t>
             </a:fld>
             <a:endParaRPr lang="en-US"/>
           </a:p>
@@ -2911,7 +2911,7 @@
           <a:p>
             <a:fld id="{B4CC5DF7-ECFD-4A94-9147-F3E6D3B8603D}" type="datetimeFigureOut">
               <a:rPr lang="en-US" smtClean="0"/>
-              <a:t>6/15/2023</a:t>
+              <a:t>7/5/2023</a:t>
             </a:fld>
             <a:endParaRPr lang="en-US"/>
           </a:p>
@@ -4088,8 +4088,8 @@
         </p:nvSpPr>
         <p:spPr>
           <a:xfrm>
-            <a:off x="2897579" y="1567543"/>
-            <a:ext cx="4334494" cy="2125683"/>
+            <a:off x="2894136" y="1567544"/>
+            <a:ext cx="4337937" cy="2121750"/>
           </a:xfrm>
           <a:prstGeom prst="rect">
             <a:avLst/>
@@ -4097,10 +4097,10 @@
           <a:gradFill flip="none" rotWithShape="1">
             <a:gsLst>
               <a:gs pos="0">
-                <a:srgbClr val="00B050"/>
+                <a:srgbClr val="00B0F0"/>
               </a:gs>
               <a:gs pos="100000">
-                <a:srgbClr val="FFC000"/>
+                <a:srgbClr val="FF0000"/>
               </a:gs>
             </a:gsLst>
             <a:lin ang="10800000" scaled="1"/>
@@ -4131,7 +4131,7 @@
           <a:lstStyle/>
           <a:p>
             <a:pPr algn="ctr"/>
-            <a:endParaRPr lang="en-US"/>
+            <a:endParaRPr lang="en-US" dirty="0"/>
           </a:p>
         </p:txBody>
       </p:sp>
@@ -4149,8 +4149,8 @@
         </p:nvSpPr>
         <p:spPr>
           <a:xfrm>
-            <a:off x="3147935" y="1573965"/>
-            <a:ext cx="3897442" cy="2098623"/>
+            <a:off x="2897605" y="1571265"/>
+            <a:ext cx="4332042" cy="2118028"/>
           </a:xfrm>
           <a:custGeom>
             <a:avLst/>
@@ -4245,6 +4245,192 @@
               <a:gd name="connsiteY2" fmla="*/ 329784 h 2098623"/>
               <a:gd name="connsiteX3" fmla="*/ 3897442 w 3897442"/>
               <a:gd name="connsiteY3" fmla="*/ 0 h 2098623"/>
+              <a:gd name="connsiteX0" fmla="*/ 0 w 3973354"/>
+              <a:gd name="connsiteY0" fmla="*/ 2120033 h 2120033"/>
+              <a:gd name="connsiteX1" fmla="*/ 1648917 w 3973354"/>
+              <a:gd name="connsiteY1" fmla="*/ 1835220 h 2120033"/>
+              <a:gd name="connsiteX2" fmla="*/ 2398425 w 3973354"/>
+              <a:gd name="connsiteY2" fmla="*/ 351194 h 2120033"/>
+              <a:gd name="connsiteX3" fmla="*/ 3850876 w 3973354"/>
+              <a:gd name="connsiteY3" fmla="*/ 25332 h 2120033"/>
+              <a:gd name="connsiteX4" fmla="*/ 3897442 w 3973354"/>
+              <a:gd name="connsiteY4" fmla="*/ 21410 h 2120033"/>
+              <a:gd name="connsiteX0" fmla="*/ 0 w 3897442"/>
+              <a:gd name="connsiteY0" fmla="*/ 2129180 h 2129180"/>
+              <a:gd name="connsiteX1" fmla="*/ 1648917 w 3897442"/>
+              <a:gd name="connsiteY1" fmla="*/ 1844367 h 2129180"/>
+              <a:gd name="connsiteX2" fmla="*/ 2398425 w 3897442"/>
+              <a:gd name="connsiteY2" fmla="*/ 360341 h 2129180"/>
+              <a:gd name="connsiteX3" fmla="*/ 3850876 w 3897442"/>
+              <a:gd name="connsiteY3" fmla="*/ 34479 h 2129180"/>
+              <a:gd name="connsiteX4" fmla="*/ 3897442 w 3897442"/>
+              <a:gd name="connsiteY4" fmla="*/ 30557 h 2129180"/>
+              <a:gd name="connsiteX0" fmla="*/ 0 w 4074759"/>
+              <a:gd name="connsiteY0" fmla="*/ 2125790 h 2125790"/>
+              <a:gd name="connsiteX1" fmla="*/ 1648917 w 4074759"/>
+              <a:gd name="connsiteY1" fmla="*/ 1840977 h 2125790"/>
+              <a:gd name="connsiteX2" fmla="*/ 2398425 w 4074759"/>
+              <a:gd name="connsiteY2" fmla="*/ 356951 h 2125790"/>
+              <a:gd name="connsiteX3" fmla="*/ 3850876 w 4074759"/>
+              <a:gd name="connsiteY3" fmla="*/ 31089 h 2125790"/>
+              <a:gd name="connsiteX4" fmla="*/ 4074759 w 4074759"/>
+              <a:gd name="connsiteY4" fmla="*/ 40901 h 2125790"/>
+              <a:gd name="connsiteX0" fmla="*/ 0 w 4081712"/>
+              <a:gd name="connsiteY0" fmla="*/ 2125790 h 2125790"/>
+              <a:gd name="connsiteX1" fmla="*/ 1648917 w 4081712"/>
+              <a:gd name="connsiteY1" fmla="*/ 1840977 h 2125790"/>
+              <a:gd name="connsiteX2" fmla="*/ 2398425 w 4081712"/>
+              <a:gd name="connsiteY2" fmla="*/ 356951 h 2125790"/>
+              <a:gd name="connsiteX3" fmla="*/ 3850876 w 4081712"/>
+              <a:gd name="connsiteY3" fmla="*/ 31089 h 2125790"/>
+              <a:gd name="connsiteX4" fmla="*/ 4081712 w 4081712"/>
+              <a:gd name="connsiteY4" fmla="*/ 40901 h 2125790"/>
+              <a:gd name="connsiteX0" fmla="*/ 0 w 4081712"/>
+              <a:gd name="connsiteY0" fmla="*/ 2094701 h 2094701"/>
+              <a:gd name="connsiteX1" fmla="*/ 1648917 w 4081712"/>
+              <a:gd name="connsiteY1" fmla="*/ 1809888 h 2094701"/>
+              <a:gd name="connsiteX2" fmla="*/ 2398425 w 4081712"/>
+              <a:gd name="connsiteY2" fmla="*/ 325862 h 2094701"/>
+              <a:gd name="connsiteX3" fmla="*/ 3850876 w 4081712"/>
+              <a:gd name="connsiteY3" fmla="*/ 0 h 2094701"/>
+              <a:gd name="connsiteX4" fmla="*/ 4081712 w 4081712"/>
+              <a:gd name="connsiteY4" fmla="*/ 9812 h 2094701"/>
+              <a:gd name="connsiteX0" fmla="*/ 0 w 4081712"/>
+              <a:gd name="connsiteY0" fmla="*/ 2094701 h 2094701"/>
+              <a:gd name="connsiteX1" fmla="*/ 1648917 w 4081712"/>
+              <a:gd name="connsiteY1" fmla="*/ 1809888 h 2094701"/>
+              <a:gd name="connsiteX2" fmla="*/ 2398425 w 4081712"/>
+              <a:gd name="connsiteY2" fmla="*/ 325862 h 2094701"/>
+              <a:gd name="connsiteX3" fmla="*/ 3850876 w 4081712"/>
+              <a:gd name="connsiteY3" fmla="*/ 0 h 2094701"/>
+              <a:gd name="connsiteX4" fmla="*/ 4081712 w 4081712"/>
+              <a:gd name="connsiteY4" fmla="*/ 2945 h 2094701"/>
+              <a:gd name="connsiteX0" fmla="*/ 0 w 4081712"/>
+              <a:gd name="connsiteY0" fmla="*/ 2094701 h 2094701"/>
+              <a:gd name="connsiteX1" fmla="*/ 1648917 w 4081712"/>
+              <a:gd name="connsiteY1" fmla="*/ 1809888 h 2094701"/>
+              <a:gd name="connsiteX2" fmla="*/ 2398425 w 4081712"/>
+              <a:gd name="connsiteY2" fmla="*/ 325862 h 2094701"/>
+              <a:gd name="connsiteX3" fmla="*/ 3850876 w 4081712"/>
+              <a:gd name="connsiteY3" fmla="*/ 0 h 2094701"/>
+              <a:gd name="connsiteX4" fmla="*/ 4081712 w 4081712"/>
+              <a:gd name="connsiteY4" fmla="*/ 2945 h 2094701"/>
+              <a:gd name="connsiteX0" fmla="*/ 0 w 4081712"/>
+              <a:gd name="connsiteY0" fmla="*/ 2094701 h 2094701"/>
+              <a:gd name="connsiteX1" fmla="*/ 1648917 w 4081712"/>
+              <a:gd name="connsiteY1" fmla="*/ 1809888 h 2094701"/>
+              <a:gd name="connsiteX2" fmla="*/ 2398425 w 4081712"/>
+              <a:gd name="connsiteY2" fmla="*/ 325862 h 2094701"/>
+              <a:gd name="connsiteX3" fmla="*/ 3850876 w 4081712"/>
+              <a:gd name="connsiteY3" fmla="*/ 0 h 2094701"/>
+              <a:gd name="connsiteX4" fmla="*/ 4081712 w 4081712"/>
+              <a:gd name="connsiteY4" fmla="*/ 2945 h 2094701"/>
+              <a:gd name="connsiteX0" fmla="*/ 0 w 4081712"/>
+              <a:gd name="connsiteY0" fmla="*/ 2094701 h 2094701"/>
+              <a:gd name="connsiteX1" fmla="*/ 1648917 w 4081712"/>
+              <a:gd name="connsiteY1" fmla="*/ 1809888 h 2094701"/>
+              <a:gd name="connsiteX2" fmla="*/ 2398425 w 4081712"/>
+              <a:gd name="connsiteY2" fmla="*/ 325862 h 2094701"/>
+              <a:gd name="connsiteX3" fmla="*/ 3850876 w 4081712"/>
+              <a:gd name="connsiteY3" fmla="*/ 0 h 2094701"/>
+              <a:gd name="connsiteX4" fmla="*/ 4081712 w 4081712"/>
+              <a:gd name="connsiteY4" fmla="*/ 2945 h 2094701"/>
+              <a:gd name="connsiteX0" fmla="*/ 99304 w 4181016"/>
+              <a:gd name="connsiteY0" fmla="*/ 2094701 h 2110285"/>
+              <a:gd name="connsiteX1" fmla="*/ 129169 w 4181016"/>
+              <a:gd name="connsiteY1" fmla="*/ 2087437 h 2110285"/>
+              <a:gd name="connsiteX2" fmla="*/ 1748221 w 4181016"/>
+              <a:gd name="connsiteY2" fmla="*/ 1809888 h 2110285"/>
+              <a:gd name="connsiteX3" fmla="*/ 2497729 w 4181016"/>
+              <a:gd name="connsiteY3" fmla="*/ 325862 h 2110285"/>
+              <a:gd name="connsiteX4" fmla="*/ 3950180 w 4181016"/>
+              <a:gd name="connsiteY4" fmla="*/ 0 h 2110285"/>
+              <a:gd name="connsiteX5" fmla="*/ 4181016 w 4181016"/>
+              <a:gd name="connsiteY5" fmla="*/ 2945 h 2110285"/>
+              <a:gd name="connsiteX0" fmla="*/ 102384 w 4184096"/>
+              <a:gd name="connsiteY0" fmla="*/ 2094701 h 2094701"/>
+              <a:gd name="connsiteX1" fmla="*/ 132249 w 4184096"/>
+              <a:gd name="connsiteY1" fmla="*/ 2087437 h 2094701"/>
+              <a:gd name="connsiteX2" fmla="*/ 1751301 w 4184096"/>
+              <a:gd name="connsiteY2" fmla="*/ 1809888 h 2094701"/>
+              <a:gd name="connsiteX3" fmla="*/ 2500809 w 4184096"/>
+              <a:gd name="connsiteY3" fmla="*/ 325862 h 2094701"/>
+              <a:gd name="connsiteX4" fmla="*/ 3953260 w 4184096"/>
+              <a:gd name="connsiteY4" fmla="*/ 0 h 2094701"/>
+              <a:gd name="connsiteX5" fmla="*/ 4184096 w 4184096"/>
+              <a:gd name="connsiteY5" fmla="*/ 2945 h 2094701"/>
+              <a:gd name="connsiteX0" fmla="*/ 0 w 4293797"/>
+              <a:gd name="connsiteY0" fmla="*/ 2098134 h 2098134"/>
+              <a:gd name="connsiteX1" fmla="*/ 241950 w 4293797"/>
+              <a:gd name="connsiteY1" fmla="*/ 2087437 h 2098134"/>
+              <a:gd name="connsiteX2" fmla="*/ 1861002 w 4293797"/>
+              <a:gd name="connsiteY2" fmla="*/ 1809888 h 2098134"/>
+              <a:gd name="connsiteX3" fmla="*/ 2610510 w 4293797"/>
+              <a:gd name="connsiteY3" fmla="*/ 325862 h 2098134"/>
+              <a:gd name="connsiteX4" fmla="*/ 4062961 w 4293797"/>
+              <a:gd name="connsiteY4" fmla="*/ 0 h 2098134"/>
+              <a:gd name="connsiteX5" fmla="*/ 4293797 w 4293797"/>
+              <a:gd name="connsiteY5" fmla="*/ 2945 h 2098134"/>
+              <a:gd name="connsiteX0" fmla="*/ 0 w 4332042"/>
+              <a:gd name="connsiteY0" fmla="*/ 2091267 h 2091267"/>
+              <a:gd name="connsiteX1" fmla="*/ 280195 w 4332042"/>
+              <a:gd name="connsiteY1" fmla="*/ 2087437 h 2091267"/>
+              <a:gd name="connsiteX2" fmla="*/ 1899247 w 4332042"/>
+              <a:gd name="connsiteY2" fmla="*/ 1809888 h 2091267"/>
+              <a:gd name="connsiteX3" fmla="*/ 2648755 w 4332042"/>
+              <a:gd name="connsiteY3" fmla="*/ 325862 h 2091267"/>
+              <a:gd name="connsiteX4" fmla="*/ 4101206 w 4332042"/>
+              <a:gd name="connsiteY4" fmla="*/ 0 h 2091267"/>
+              <a:gd name="connsiteX5" fmla="*/ 4332042 w 4332042"/>
+              <a:gd name="connsiteY5" fmla="*/ 2945 h 2091267"/>
+              <a:gd name="connsiteX0" fmla="*/ 0 w 4332042"/>
+              <a:gd name="connsiteY0" fmla="*/ 2091267 h 2091267"/>
+              <a:gd name="connsiteX1" fmla="*/ 280195 w 4332042"/>
+              <a:gd name="connsiteY1" fmla="*/ 2087437 h 2091267"/>
+              <a:gd name="connsiteX2" fmla="*/ 1899247 w 4332042"/>
+              <a:gd name="connsiteY2" fmla="*/ 1809888 h 2091267"/>
+              <a:gd name="connsiteX3" fmla="*/ 2648755 w 4332042"/>
+              <a:gd name="connsiteY3" fmla="*/ 325862 h 2091267"/>
+              <a:gd name="connsiteX4" fmla="*/ 4101206 w 4332042"/>
+              <a:gd name="connsiteY4" fmla="*/ 0 h 2091267"/>
+              <a:gd name="connsiteX5" fmla="*/ 4332042 w 4332042"/>
+              <a:gd name="connsiteY5" fmla="*/ 2945 h 2091267"/>
+              <a:gd name="connsiteX0" fmla="*/ 0 w 4332042"/>
+              <a:gd name="connsiteY0" fmla="*/ 2091267 h 2091267"/>
+              <a:gd name="connsiteX1" fmla="*/ 280195 w 4332042"/>
+              <a:gd name="connsiteY1" fmla="*/ 2087437 h 2091267"/>
+              <a:gd name="connsiteX2" fmla="*/ 1899247 w 4332042"/>
+              <a:gd name="connsiteY2" fmla="*/ 1809888 h 2091267"/>
+              <a:gd name="connsiteX3" fmla="*/ 2648755 w 4332042"/>
+              <a:gd name="connsiteY3" fmla="*/ 325862 h 2091267"/>
+              <a:gd name="connsiteX4" fmla="*/ 4101206 w 4332042"/>
+              <a:gd name="connsiteY4" fmla="*/ 0 h 2091267"/>
+              <a:gd name="connsiteX5" fmla="*/ 4332042 w 4332042"/>
+              <a:gd name="connsiteY5" fmla="*/ 2945 h 2091267"/>
+              <a:gd name="connsiteX0" fmla="*/ 0 w 4332042"/>
+              <a:gd name="connsiteY0" fmla="*/ 2091515 h 2091515"/>
+              <a:gd name="connsiteX1" fmla="*/ 280195 w 4332042"/>
+              <a:gd name="connsiteY1" fmla="*/ 2087685 h 2091515"/>
+              <a:gd name="connsiteX2" fmla="*/ 1899247 w 4332042"/>
+              <a:gd name="connsiteY2" fmla="*/ 1810136 h 2091515"/>
+              <a:gd name="connsiteX3" fmla="*/ 2648755 w 4332042"/>
+              <a:gd name="connsiteY3" fmla="*/ 326110 h 2091515"/>
+              <a:gd name="connsiteX4" fmla="*/ 4101206 w 4332042"/>
+              <a:gd name="connsiteY4" fmla="*/ 248 h 2091515"/>
+              <a:gd name="connsiteX5" fmla="*/ 4332042 w 4332042"/>
+              <a:gd name="connsiteY5" fmla="*/ 3193 h 2091515"/>
+              <a:gd name="connsiteX0" fmla="*/ 0 w 4332042"/>
+              <a:gd name="connsiteY0" fmla="*/ 2091515 h 2091515"/>
+              <a:gd name="connsiteX1" fmla="*/ 280195 w 4332042"/>
+              <a:gd name="connsiteY1" fmla="*/ 2087685 h 2091515"/>
+              <a:gd name="connsiteX2" fmla="*/ 1899247 w 4332042"/>
+              <a:gd name="connsiteY2" fmla="*/ 1810136 h 2091515"/>
+              <a:gd name="connsiteX3" fmla="*/ 2648755 w 4332042"/>
+              <a:gd name="connsiteY3" fmla="*/ 326110 h 2091515"/>
+              <a:gd name="connsiteX4" fmla="*/ 4101206 w 4332042"/>
+              <a:gd name="connsiteY4" fmla="*/ 248 h 2091515"/>
+              <a:gd name="connsiteX5" fmla="*/ 4332042 w 4332042"/>
+              <a:gd name="connsiteY5" fmla="*/ 3193 h 2091515"/>
             </a:gdLst>
             <a:ahLst/>
             <a:cxnLst>
@@ -4260,28 +4446,42 @@
               <a:cxn ang="0">
                 <a:pos x="connsiteX3" y="connsiteY3"/>
               </a:cxn>
+              <a:cxn ang="0">
+                <a:pos x="connsiteX4" y="connsiteY4"/>
+              </a:cxn>
+              <a:cxn ang="0">
+                <a:pos x="connsiteX5" y="connsiteY5"/>
+              </a:cxn>
             </a:cxnLst>
             <a:rect l="l" t="t" r="r" b="b"/>
             <a:pathLst>
-              <a:path w="3897442" h="2098623">
+              <a:path w="4332042" h="2091515">
                 <a:moveTo>
-                  <a:pt x="0" y="2098623"/>
+                  <a:pt x="0" y="2091515"/>
                 </a:moveTo>
                 <a:cubicBezTo>
-                  <a:pt x="538397" y="2081135"/>
-                  <a:pt x="1249180" y="2108617"/>
-                  <a:pt x="1648917" y="1813810"/>
+                  <a:pt x="4977" y="2090304"/>
+                  <a:pt x="-1577" y="2090522"/>
+                  <a:pt x="280195" y="2087685"/>
                 </a:cubicBezTo>
                 <a:cubicBezTo>
-                  <a:pt x="2048655" y="1519004"/>
-                  <a:pt x="2023671" y="632086"/>
-                  <a:pt x="2398425" y="329784"/>
+                  <a:pt x="749715" y="2091716"/>
+                  <a:pt x="1504487" y="2103732"/>
+                  <a:pt x="1899247" y="1810136"/>
                 </a:cubicBezTo>
                 <a:cubicBezTo>
-                  <a:pt x="2773179" y="27482"/>
-                  <a:pt x="3530182" y="9994"/>
-                  <a:pt x="3897442" y="0"/>
+                  <a:pt x="2294007" y="1516540"/>
+                  <a:pt x="2281762" y="627758"/>
+                  <a:pt x="2648755" y="326110"/>
                 </a:cubicBezTo>
+                <a:cubicBezTo>
+                  <a:pt x="3015748" y="24462"/>
+                  <a:pt x="3802694" y="-3153"/>
+                  <a:pt x="4101206" y="248"/>
+                </a:cubicBezTo>
+                <a:lnTo>
+                  <a:pt x="4332042" y="3193"/>
+                </a:lnTo>
               </a:path>
             </a:pathLst>
           </a:custGeom>
@@ -4331,8 +4531,8 @@
         </p:nvSpPr>
         <p:spPr>
           <a:xfrm flipH="1">
-            <a:off x="3207894" y="1589934"/>
-            <a:ext cx="3822492" cy="2083632"/>
+            <a:off x="2892607" y="1571264"/>
+            <a:ext cx="4337937" cy="2114306"/>
           </a:xfrm>
           <a:custGeom>
             <a:avLst/>
@@ -4499,6 +4699,362 @@
               <a:gd name="connsiteY2" fmla="*/ 254832 h 2083632"/>
               <a:gd name="connsiteX3" fmla="*/ 3822492 w 3822492"/>
               <a:gd name="connsiteY3" fmla="*/ 0 h 2083632"/>
+              <a:gd name="connsiteX0" fmla="*/ 92769 w 3915261"/>
+              <a:gd name="connsiteY0" fmla="*/ 2083632 h 2102966"/>
+              <a:gd name="connsiteX1" fmla="*/ 103484 w 3915261"/>
+              <a:gd name="connsiteY1" fmla="*/ 2082791 h 2102966"/>
+              <a:gd name="connsiteX2" fmla="*/ 1456873 w 3915261"/>
+              <a:gd name="connsiteY2" fmla="*/ 1813809 h 2102966"/>
+              <a:gd name="connsiteX3" fmla="*/ 2356283 w 3915261"/>
+              <a:gd name="connsiteY3" fmla="*/ 254832 h 2102966"/>
+              <a:gd name="connsiteX4" fmla="*/ 3915261 w 3915261"/>
+              <a:gd name="connsiteY4" fmla="*/ 0 h 2102966"/>
+              <a:gd name="connsiteX0" fmla="*/ 106669 w 3929161"/>
+              <a:gd name="connsiteY0" fmla="*/ 2083632 h 2084811"/>
+              <a:gd name="connsiteX1" fmla="*/ 117384 w 3929161"/>
+              <a:gd name="connsiteY1" fmla="*/ 2082791 h 2084811"/>
+              <a:gd name="connsiteX2" fmla="*/ 1470773 w 3929161"/>
+              <a:gd name="connsiteY2" fmla="*/ 1813809 h 2084811"/>
+              <a:gd name="connsiteX3" fmla="*/ 2370183 w 3929161"/>
+              <a:gd name="connsiteY3" fmla="*/ 254832 h 2084811"/>
+              <a:gd name="connsiteX4" fmla="*/ 3929161 w 3929161"/>
+              <a:gd name="connsiteY4" fmla="*/ 0 h 2084811"/>
+              <a:gd name="connsiteX0" fmla="*/ 68229 w 3890721"/>
+              <a:gd name="connsiteY0" fmla="*/ 2083632 h 2084811"/>
+              <a:gd name="connsiteX1" fmla="*/ 134573 w 3890721"/>
+              <a:gd name="connsiteY1" fmla="*/ 2082791 h 2084811"/>
+              <a:gd name="connsiteX2" fmla="*/ 1432333 w 3890721"/>
+              <a:gd name="connsiteY2" fmla="*/ 1813809 h 2084811"/>
+              <a:gd name="connsiteX3" fmla="*/ 2331743 w 3890721"/>
+              <a:gd name="connsiteY3" fmla="*/ 254832 h 2084811"/>
+              <a:gd name="connsiteX4" fmla="*/ 3890721 w 3890721"/>
+              <a:gd name="connsiteY4" fmla="*/ 0 h 2084811"/>
+              <a:gd name="connsiteX0" fmla="*/ 0 w 4024146"/>
+              <a:gd name="connsiteY0" fmla="*/ 2076816 h 2083753"/>
+              <a:gd name="connsiteX1" fmla="*/ 267998 w 4024146"/>
+              <a:gd name="connsiteY1" fmla="*/ 2082791 h 2083753"/>
+              <a:gd name="connsiteX2" fmla="*/ 1565758 w 4024146"/>
+              <a:gd name="connsiteY2" fmla="*/ 1813809 h 2083753"/>
+              <a:gd name="connsiteX3" fmla="*/ 2465168 w 4024146"/>
+              <a:gd name="connsiteY3" fmla="*/ 254832 h 2083753"/>
+              <a:gd name="connsiteX4" fmla="*/ 4024146 w 4024146"/>
+              <a:gd name="connsiteY4" fmla="*/ 0 h 2083753"/>
+              <a:gd name="connsiteX0" fmla="*/ 0 w 4024146"/>
+              <a:gd name="connsiteY0" fmla="*/ 2076816 h 2083753"/>
+              <a:gd name="connsiteX1" fmla="*/ 267998 w 4024146"/>
+              <a:gd name="connsiteY1" fmla="*/ 2082791 h 2083753"/>
+              <a:gd name="connsiteX2" fmla="*/ 1565758 w 4024146"/>
+              <a:gd name="connsiteY2" fmla="*/ 1813809 h 2083753"/>
+              <a:gd name="connsiteX3" fmla="*/ 2465168 w 4024146"/>
+              <a:gd name="connsiteY3" fmla="*/ 254832 h 2083753"/>
+              <a:gd name="connsiteX4" fmla="*/ 4024146 w 4024146"/>
+              <a:gd name="connsiteY4" fmla="*/ 0 h 2083753"/>
+              <a:gd name="connsiteX0" fmla="*/ 2449 w 3970966"/>
+              <a:gd name="connsiteY0" fmla="*/ 2083632 h 2084811"/>
+              <a:gd name="connsiteX1" fmla="*/ 214818 w 3970966"/>
+              <a:gd name="connsiteY1" fmla="*/ 2082791 h 2084811"/>
+              <a:gd name="connsiteX2" fmla="*/ 1512578 w 3970966"/>
+              <a:gd name="connsiteY2" fmla="*/ 1813809 h 2084811"/>
+              <a:gd name="connsiteX3" fmla="*/ 2411988 w 3970966"/>
+              <a:gd name="connsiteY3" fmla="*/ 254832 h 2084811"/>
+              <a:gd name="connsiteX4" fmla="*/ 3970966 w 3970966"/>
+              <a:gd name="connsiteY4" fmla="*/ 0 h 2084811"/>
+              <a:gd name="connsiteX0" fmla="*/ 0 w 3999808"/>
+              <a:gd name="connsiteY0" fmla="*/ 2070000 h 2083422"/>
+              <a:gd name="connsiteX1" fmla="*/ 243660 w 3999808"/>
+              <a:gd name="connsiteY1" fmla="*/ 2082791 h 2083422"/>
+              <a:gd name="connsiteX2" fmla="*/ 1541420 w 3999808"/>
+              <a:gd name="connsiteY2" fmla="*/ 1813809 h 2083422"/>
+              <a:gd name="connsiteX3" fmla="*/ 2440830 w 3999808"/>
+              <a:gd name="connsiteY3" fmla="*/ 254832 h 2083422"/>
+              <a:gd name="connsiteX4" fmla="*/ 3999808 w 3999808"/>
+              <a:gd name="connsiteY4" fmla="*/ 0 h 2083422"/>
+              <a:gd name="connsiteX0" fmla="*/ 0 w 4027622"/>
+              <a:gd name="connsiteY0" fmla="*/ 2083632 h 2084811"/>
+              <a:gd name="connsiteX1" fmla="*/ 271474 w 4027622"/>
+              <a:gd name="connsiteY1" fmla="*/ 2082791 h 2084811"/>
+              <a:gd name="connsiteX2" fmla="*/ 1569234 w 4027622"/>
+              <a:gd name="connsiteY2" fmla="*/ 1813809 h 2084811"/>
+              <a:gd name="connsiteX3" fmla="*/ 2468644 w 4027622"/>
+              <a:gd name="connsiteY3" fmla="*/ 254832 h 2084811"/>
+              <a:gd name="connsiteX4" fmla="*/ 4027622 w 4027622"/>
+              <a:gd name="connsiteY4" fmla="*/ 0 h 2084811"/>
+              <a:gd name="connsiteX0" fmla="*/ 0 w 4105521"/>
+              <a:gd name="connsiteY0" fmla="*/ 2107530 h 2108709"/>
+              <a:gd name="connsiteX1" fmla="*/ 271474 w 4105521"/>
+              <a:gd name="connsiteY1" fmla="*/ 2106689 h 2108709"/>
+              <a:gd name="connsiteX2" fmla="*/ 1569234 w 4105521"/>
+              <a:gd name="connsiteY2" fmla="*/ 1837707 h 2108709"/>
+              <a:gd name="connsiteX3" fmla="*/ 2468644 w 4105521"/>
+              <a:gd name="connsiteY3" fmla="*/ 278730 h 2108709"/>
+              <a:gd name="connsiteX4" fmla="*/ 3977750 w 4105521"/>
+              <a:gd name="connsiteY4" fmla="*/ 17569 h 2108709"/>
+              <a:gd name="connsiteX5" fmla="*/ 4027622 w 4105521"/>
+              <a:gd name="connsiteY5" fmla="*/ 23898 h 2108709"/>
+              <a:gd name="connsiteX0" fmla="*/ 0 w 4326628"/>
+              <a:gd name="connsiteY0" fmla="*/ 2104917 h 2106096"/>
+              <a:gd name="connsiteX1" fmla="*/ 271474 w 4326628"/>
+              <a:gd name="connsiteY1" fmla="*/ 2104076 h 2106096"/>
+              <a:gd name="connsiteX2" fmla="*/ 1569234 w 4326628"/>
+              <a:gd name="connsiteY2" fmla="*/ 1835094 h 2106096"/>
+              <a:gd name="connsiteX3" fmla="*/ 2468644 w 4326628"/>
+              <a:gd name="connsiteY3" fmla="*/ 276117 h 2106096"/>
+              <a:gd name="connsiteX4" fmla="*/ 3977750 w 4326628"/>
+              <a:gd name="connsiteY4" fmla="*/ 14956 h 2106096"/>
+              <a:gd name="connsiteX5" fmla="*/ 4326628 w 4326628"/>
+              <a:gd name="connsiteY5" fmla="*/ 34917 h 2106096"/>
+              <a:gd name="connsiteX0" fmla="*/ 0 w 4326628"/>
+              <a:gd name="connsiteY0" fmla="*/ 2089961 h 2091140"/>
+              <a:gd name="connsiteX1" fmla="*/ 271474 w 4326628"/>
+              <a:gd name="connsiteY1" fmla="*/ 2089120 h 2091140"/>
+              <a:gd name="connsiteX2" fmla="*/ 1569234 w 4326628"/>
+              <a:gd name="connsiteY2" fmla="*/ 1820138 h 2091140"/>
+              <a:gd name="connsiteX3" fmla="*/ 2468644 w 4326628"/>
+              <a:gd name="connsiteY3" fmla="*/ 261161 h 2091140"/>
+              <a:gd name="connsiteX4" fmla="*/ 3977750 w 4326628"/>
+              <a:gd name="connsiteY4" fmla="*/ 0 h 2091140"/>
+              <a:gd name="connsiteX5" fmla="*/ 4326628 w 4326628"/>
+              <a:gd name="connsiteY5" fmla="*/ 19961 h 2091140"/>
+              <a:gd name="connsiteX0" fmla="*/ 0 w 4326628"/>
+              <a:gd name="connsiteY0" fmla="*/ 2090047 h 2091226"/>
+              <a:gd name="connsiteX1" fmla="*/ 271474 w 4326628"/>
+              <a:gd name="connsiteY1" fmla="*/ 2089206 h 2091226"/>
+              <a:gd name="connsiteX2" fmla="*/ 1569234 w 4326628"/>
+              <a:gd name="connsiteY2" fmla="*/ 1820224 h 2091226"/>
+              <a:gd name="connsiteX3" fmla="*/ 2468644 w 4326628"/>
+              <a:gd name="connsiteY3" fmla="*/ 261247 h 2091226"/>
+              <a:gd name="connsiteX4" fmla="*/ 3977750 w 4326628"/>
+              <a:gd name="connsiteY4" fmla="*/ 86 h 2091226"/>
+              <a:gd name="connsiteX5" fmla="*/ 4326628 w 4326628"/>
+              <a:gd name="connsiteY5" fmla="*/ 20047 h 2091226"/>
+              <a:gd name="connsiteX0" fmla="*/ 0 w 4333582"/>
+              <a:gd name="connsiteY0" fmla="*/ 2089961 h 2091140"/>
+              <a:gd name="connsiteX1" fmla="*/ 271474 w 4333582"/>
+              <a:gd name="connsiteY1" fmla="*/ 2089120 h 2091140"/>
+              <a:gd name="connsiteX2" fmla="*/ 1569234 w 4333582"/>
+              <a:gd name="connsiteY2" fmla="*/ 1820138 h 2091140"/>
+              <a:gd name="connsiteX3" fmla="*/ 2468644 w 4333582"/>
+              <a:gd name="connsiteY3" fmla="*/ 261161 h 2091140"/>
+              <a:gd name="connsiteX4" fmla="*/ 3977750 w 4333582"/>
+              <a:gd name="connsiteY4" fmla="*/ 0 h 2091140"/>
+              <a:gd name="connsiteX5" fmla="*/ 4333582 w 4333582"/>
+              <a:gd name="connsiteY5" fmla="*/ 2921 h 2091140"/>
+              <a:gd name="connsiteX0" fmla="*/ 0 w 4333582"/>
+              <a:gd name="connsiteY0" fmla="*/ 2089961 h 2091140"/>
+              <a:gd name="connsiteX1" fmla="*/ 271474 w 4333582"/>
+              <a:gd name="connsiteY1" fmla="*/ 2089120 h 2091140"/>
+              <a:gd name="connsiteX2" fmla="*/ 1569234 w 4333582"/>
+              <a:gd name="connsiteY2" fmla="*/ 1820138 h 2091140"/>
+              <a:gd name="connsiteX3" fmla="*/ 2468644 w 4333582"/>
+              <a:gd name="connsiteY3" fmla="*/ 261161 h 2091140"/>
+              <a:gd name="connsiteX4" fmla="*/ 3977750 w 4333582"/>
+              <a:gd name="connsiteY4" fmla="*/ 0 h 2091140"/>
+              <a:gd name="connsiteX5" fmla="*/ 4333582 w 4333582"/>
+              <a:gd name="connsiteY5" fmla="*/ 2921 h 2091140"/>
+              <a:gd name="connsiteX0" fmla="*/ 0 w 4333582"/>
+              <a:gd name="connsiteY0" fmla="*/ 2089961 h 2091140"/>
+              <a:gd name="connsiteX1" fmla="*/ 271474 w 4333582"/>
+              <a:gd name="connsiteY1" fmla="*/ 2089120 h 2091140"/>
+              <a:gd name="connsiteX2" fmla="*/ 1569234 w 4333582"/>
+              <a:gd name="connsiteY2" fmla="*/ 1820138 h 2091140"/>
+              <a:gd name="connsiteX3" fmla="*/ 2468644 w 4333582"/>
+              <a:gd name="connsiteY3" fmla="*/ 261161 h 2091140"/>
+              <a:gd name="connsiteX4" fmla="*/ 3977750 w 4333582"/>
+              <a:gd name="connsiteY4" fmla="*/ 0 h 2091140"/>
+              <a:gd name="connsiteX5" fmla="*/ 4333582 w 4333582"/>
+              <a:gd name="connsiteY5" fmla="*/ 2921 h 2091140"/>
+              <a:gd name="connsiteX0" fmla="*/ 0 w 4333582"/>
+              <a:gd name="connsiteY0" fmla="*/ 2089961 h 2091140"/>
+              <a:gd name="connsiteX1" fmla="*/ 271474 w 4333582"/>
+              <a:gd name="connsiteY1" fmla="*/ 2089120 h 2091140"/>
+              <a:gd name="connsiteX2" fmla="*/ 1569234 w 4333582"/>
+              <a:gd name="connsiteY2" fmla="*/ 1820138 h 2091140"/>
+              <a:gd name="connsiteX3" fmla="*/ 2468644 w 4333582"/>
+              <a:gd name="connsiteY3" fmla="*/ 261161 h 2091140"/>
+              <a:gd name="connsiteX4" fmla="*/ 3977750 w 4333582"/>
+              <a:gd name="connsiteY4" fmla="*/ 0 h 2091140"/>
+              <a:gd name="connsiteX5" fmla="*/ 4333582 w 4333582"/>
+              <a:gd name="connsiteY5" fmla="*/ 2921 h 2091140"/>
+              <a:gd name="connsiteX0" fmla="*/ 0 w 4333582"/>
+              <a:gd name="connsiteY0" fmla="*/ 2089961 h 2091140"/>
+              <a:gd name="connsiteX1" fmla="*/ 271474 w 4333582"/>
+              <a:gd name="connsiteY1" fmla="*/ 2089120 h 2091140"/>
+              <a:gd name="connsiteX2" fmla="*/ 1569234 w 4333582"/>
+              <a:gd name="connsiteY2" fmla="*/ 1820138 h 2091140"/>
+              <a:gd name="connsiteX3" fmla="*/ 2468644 w 4333582"/>
+              <a:gd name="connsiteY3" fmla="*/ 261161 h 2091140"/>
+              <a:gd name="connsiteX4" fmla="*/ 3977750 w 4333582"/>
+              <a:gd name="connsiteY4" fmla="*/ 0 h 2091140"/>
+              <a:gd name="connsiteX5" fmla="*/ 4333582 w 4333582"/>
+              <a:gd name="connsiteY5" fmla="*/ 2921 h 2091140"/>
+              <a:gd name="connsiteX0" fmla="*/ 0 w 4333582"/>
+              <a:gd name="connsiteY0" fmla="*/ 2089961 h 2091140"/>
+              <a:gd name="connsiteX1" fmla="*/ 271474 w 4333582"/>
+              <a:gd name="connsiteY1" fmla="*/ 2089120 h 2091140"/>
+              <a:gd name="connsiteX2" fmla="*/ 1569234 w 4333582"/>
+              <a:gd name="connsiteY2" fmla="*/ 1820138 h 2091140"/>
+              <a:gd name="connsiteX3" fmla="*/ 2468644 w 4333582"/>
+              <a:gd name="connsiteY3" fmla="*/ 261161 h 2091140"/>
+              <a:gd name="connsiteX4" fmla="*/ 3977750 w 4333582"/>
+              <a:gd name="connsiteY4" fmla="*/ 0 h 2091140"/>
+              <a:gd name="connsiteX5" fmla="*/ 4333582 w 4333582"/>
+              <a:gd name="connsiteY5" fmla="*/ 2921 h 2091140"/>
+              <a:gd name="connsiteX0" fmla="*/ 0 w 4333582"/>
+              <a:gd name="connsiteY0" fmla="*/ 2087152 h 2088331"/>
+              <a:gd name="connsiteX1" fmla="*/ 271474 w 4333582"/>
+              <a:gd name="connsiteY1" fmla="*/ 2086311 h 2088331"/>
+              <a:gd name="connsiteX2" fmla="*/ 1569234 w 4333582"/>
+              <a:gd name="connsiteY2" fmla="*/ 1817329 h 2088331"/>
+              <a:gd name="connsiteX3" fmla="*/ 2468644 w 4333582"/>
+              <a:gd name="connsiteY3" fmla="*/ 258352 h 2088331"/>
+              <a:gd name="connsiteX4" fmla="*/ 3845631 w 4333582"/>
+              <a:gd name="connsiteY4" fmla="*/ 599 h 2088331"/>
+              <a:gd name="connsiteX5" fmla="*/ 4333582 w 4333582"/>
+              <a:gd name="connsiteY5" fmla="*/ 112 h 2088331"/>
+              <a:gd name="connsiteX0" fmla="*/ 0 w 4333582"/>
+              <a:gd name="connsiteY0" fmla="*/ 2087040 h 2088219"/>
+              <a:gd name="connsiteX1" fmla="*/ 271474 w 4333582"/>
+              <a:gd name="connsiteY1" fmla="*/ 2086199 h 2088219"/>
+              <a:gd name="connsiteX2" fmla="*/ 1569234 w 4333582"/>
+              <a:gd name="connsiteY2" fmla="*/ 1817217 h 2088219"/>
+              <a:gd name="connsiteX3" fmla="*/ 2468644 w 4333582"/>
+              <a:gd name="connsiteY3" fmla="*/ 258240 h 2088219"/>
+              <a:gd name="connsiteX4" fmla="*/ 3845631 w 4333582"/>
+              <a:gd name="connsiteY4" fmla="*/ 487 h 2088219"/>
+              <a:gd name="connsiteX5" fmla="*/ 4333582 w 4333582"/>
+              <a:gd name="connsiteY5" fmla="*/ 0 h 2088219"/>
+              <a:gd name="connsiteX0" fmla="*/ 0 w 4333582"/>
+              <a:gd name="connsiteY0" fmla="*/ 2087040 h 2088219"/>
+              <a:gd name="connsiteX1" fmla="*/ 271474 w 4333582"/>
+              <a:gd name="connsiteY1" fmla="*/ 2086199 h 2088219"/>
+              <a:gd name="connsiteX2" fmla="*/ 1569234 w 4333582"/>
+              <a:gd name="connsiteY2" fmla="*/ 1817217 h 2088219"/>
+              <a:gd name="connsiteX3" fmla="*/ 2468644 w 4333582"/>
+              <a:gd name="connsiteY3" fmla="*/ 258240 h 2088219"/>
+              <a:gd name="connsiteX4" fmla="*/ 3845631 w 4333582"/>
+              <a:gd name="connsiteY4" fmla="*/ 487 h 2088219"/>
+              <a:gd name="connsiteX5" fmla="*/ 4333582 w 4333582"/>
+              <a:gd name="connsiteY5" fmla="*/ 0 h 2088219"/>
+              <a:gd name="connsiteX0" fmla="*/ 0 w 4333582"/>
+              <a:gd name="connsiteY0" fmla="*/ 2087040 h 2088219"/>
+              <a:gd name="connsiteX1" fmla="*/ 271474 w 4333582"/>
+              <a:gd name="connsiteY1" fmla="*/ 2086199 h 2088219"/>
+              <a:gd name="connsiteX2" fmla="*/ 1569234 w 4333582"/>
+              <a:gd name="connsiteY2" fmla="*/ 1817217 h 2088219"/>
+              <a:gd name="connsiteX3" fmla="*/ 2468644 w 4333582"/>
+              <a:gd name="connsiteY3" fmla="*/ 258240 h 2088219"/>
+              <a:gd name="connsiteX4" fmla="*/ 3845631 w 4333582"/>
+              <a:gd name="connsiteY4" fmla="*/ 487 h 2088219"/>
+              <a:gd name="connsiteX5" fmla="*/ 4333582 w 4333582"/>
+              <a:gd name="connsiteY5" fmla="*/ 0 h 2088219"/>
+              <a:gd name="connsiteX0" fmla="*/ 0 w 4333582"/>
+              <a:gd name="connsiteY0" fmla="*/ 2087040 h 2088219"/>
+              <a:gd name="connsiteX1" fmla="*/ 271474 w 4333582"/>
+              <a:gd name="connsiteY1" fmla="*/ 2086199 h 2088219"/>
+              <a:gd name="connsiteX2" fmla="*/ 1569234 w 4333582"/>
+              <a:gd name="connsiteY2" fmla="*/ 1817217 h 2088219"/>
+              <a:gd name="connsiteX3" fmla="*/ 2468644 w 4333582"/>
+              <a:gd name="connsiteY3" fmla="*/ 258240 h 2088219"/>
+              <a:gd name="connsiteX4" fmla="*/ 3845631 w 4333582"/>
+              <a:gd name="connsiteY4" fmla="*/ 487 h 2088219"/>
+              <a:gd name="connsiteX5" fmla="*/ 4333582 w 4333582"/>
+              <a:gd name="connsiteY5" fmla="*/ 0 h 2088219"/>
+              <a:gd name="connsiteX0" fmla="*/ 0 w 4333582"/>
+              <a:gd name="connsiteY0" fmla="*/ 2087040 h 2088219"/>
+              <a:gd name="connsiteX1" fmla="*/ 271474 w 4333582"/>
+              <a:gd name="connsiteY1" fmla="*/ 2086199 h 2088219"/>
+              <a:gd name="connsiteX2" fmla="*/ 1569234 w 4333582"/>
+              <a:gd name="connsiteY2" fmla="*/ 1817217 h 2088219"/>
+              <a:gd name="connsiteX3" fmla="*/ 2468644 w 4333582"/>
+              <a:gd name="connsiteY3" fmla="*/ 258240 h 2088219"/>
+              <a:gd name="connsiteX4" fmla="*/ 3845631 w 4333582"/>
+              <a:gd name="connsiteY4" fmla="*/ 487 h 2088219"/>
+              <a:gd name="connsiteX5" fmla="*/ 4333582 w 4333582"/>
+              <a:gd name="connsiteY5" fmla="*/ 0 h 2088219"/>
+              <a:gd name="connsiteX0" fmla="*/ 0 w 4333582"/>
+              <a:gd name="connsiteY0" fmla="*/ 2087040 h 2088219"/>
+              <a:gd name="connsiteX1" fmla="*/ 271474 w 4333582"/>
+              <a:gd name="connsiteY1" fmla="*/ 2086199 h 2088219"/>
+              <a:gd name="connsiteX2" fmla="*/ 1569234 w 4333582"/>
+              <a:gd name="connsiteY2" fmla="*/ 1817217 h 2088219"/>
+              <a:gd name="connsiteX3" fmla="*/ 2468644 w 4333582"/>
+              <a:gd name="connsiteY3" fmla="*/ 258240 h 2088219"/>
+              <a:gd name="connsiteX4" fmla="*/ 3845631 w 4333582"/>
+              <a:gd name="connsiteY4" fmla="*/ 487 h 2088219"/>
+              <a:gd name="connsiteX5" fmla="*/ 4333582 w 4333582"/>
+              <a:gd name="connsiteY5" fmla="*/ 0 h 2088219"/>
+              <a:gd name="connsiteX0" fmla="*/ 0 w 4333582"/>
+              <a:gd name="connsiteY0" fmla="*/ 2087040 h 2088219"/>
+              <a:gd name="connsiteX1" fmla="*/ 271474 w 4333582"/>
+              <a:gd name="connsiteY1" fmla="*/ 2086199 h 2088219"/>
+              <a:gd name="connsiteX2" fmla="*/ 1569234 w 4333582"/>
+              <a:gd name="connsiteY2" fmla="*/ 1817217 h 2088219"/>
+              <a:gd name="connsiteX3" fmla="*/ 2468644 w 4333582"/>
+              <a:gd name="connsiteY3" fmla="*/ 258240 h 2088219"/>
+              <a:gd name="connsiteX4" fmla="*/ 3845631 w 4333582"/>
+              <a:gd name="connsiteY4" fmla="*/ 487 h 2088219"/>
+              <a:gd name="connsiteX5" fmla="*/ 4333582 w 4333582"/>
+              <a:gd name="connsiteY5" fmla="*/ 0 h 2088219"/>
+              <a:gd name="connsiteX0" fmla="*/ 0 w 4333582"/>
+              <a:gd name="connsiteY0" fmla="*/ 2087040 h 2088219"/>
+              <a:gd name="connsiteX1" fmla="*/ 271474 w 4333582"/>
+              <a:gd name="connsiteY1" fmla="*/ 2086199 h 2088219"/>
+              <a:gd name="connsiteX2" fmla="*/ 1569234 w 4333582"/>
+              <a:gd name="connsiteY2" fmla="*/ 1817217 h 2088219"/>
+              <a:gd name="connsiteX3" fmla="*/ 2468644 w 4333582"/>
+              <a:gd name="connsiteY3" fmla="*/ 258240 h 2088219"/>
+              <a:gd name="connsiteX4" fmla="*/ 3845631 w 4333582"/>
+              <a:gd name="connsiteY4" fmla="*/ 487 h 2088219"/>
+              <a:gd name="connsiteX5" fmla="*/ 4333582 w 4333582"/>
+              <a:gd name="connsiteY5" fmla="*/ 0 h 2088219"/>
+              <a:gd name="connsiteX0" fmla="*/ 0 w 4333582"/>
+              <a:gd name="connsiteY0" fmla="*/ 2087040 h 2088219"/>
+              <a:gd name="connsiteX1" fmla="*/ 271474 w 4333582"/>
+              <a:gd name="connsiteY1" fmla="*/ 2086199 h 2088219"/>
+              <a:gd name="connsiteX2" fmla="*/ 1569234 w 4333582"/>
+              <a:gd name="connsiteY2" fmla="*/ 1817217 h 2088219"/>
+              <a:gd name="connsiteX3" fmla="*/ 2468644 w 4333582"/>
+              <a:gd name="connsiteY3" fmla="*/ 258240 h 2088219"/>
+              <a:gd name="connsiteX4" fmla="*/ 3845631 w 4333582"/>
+              <a:gd name="connsiteY4" fmla="*/ 487 h 2088219"/>
+              <a:gd name="connsiteX5" fmla="*/ 4333582 w 4333582"/>
+              <a:gd name="connsiteY5" fmla="*/ 0 h 2088219"/>
+              <a:gd name="connsiteX0" fmla="*/ 0 w 4333582"/>
+              <a:gd name="connsiteY0" fmla="*/ 2087040 h 2088219"/>
+              <a:gd name="connsiteX1" fmla="*/ 271474 w 4333582"/>
+              <a:gd name="connsiteY1" fmla="*/ 2086199 h 2088219"/>
+              <a:gd name="connsiteX2" fmla="*/ 1569234 w 4333582"/>
+              <a:gd name="connsiteY2" fmla="*/ 1817217 h 2088219"/>
+              <a:gd name="connsiteX3" fmla="*/ 2468644 w 4333582"/>
+              <a:gd name="connsiteY3" fmla="*/ 258240 h 2088219"/>
+              <a:gd name="connsiteX4" fmla="*/ 3845631 w 4333582"/>
+              <a:gd name="connsiteY4" fmla="*/ 487 h 2088219"/>
+              <a:gd name="connsiteX5" fmla="*/ 4333582 w 4333582"/>
+              <a:gd name="connsiteY5" fmla="*/ 0 h 2088219"/>
+              <a:gd name="connsiteX0" fmla="*/ 0 w 4333582"/>
+              <a:gd name="connsiteY0" fmla="*/ 2087040 h 2088219"/>
+              <a:gd name="connsiteX1" fmla="*/ 271474 w 4333582"/>
+              <a:gd name="connsiteY1" fmla="*/ 2086199 h 2088219"/>
+              <a:gd name="connsiteX2" fmla="*/ 1569234 w 4333582"/>
+              <a:gd name="connsiteY2" fmla="*/ 1817217 h 2088219"/>
+              <a:gd name="connsiteX3" fmla="*/ 2468644 w 4333582"/>
+              <a:gd name="connsiteY3" fmla="*/ 258240 h 2088219"/>
+              <a:gd name="connsiteX4" fmla="*/ 3845631 w 4333582"/>
+              <a:gd name="connsiteY4" fmla="*/ 487 h 2088219"/>
+              <a:gd name="connsiteX5" fmla="*/ 4333582 w 4333582"/>
+              <a:gd name="connsiteY5" fmla="*/ 0 h 2088219"/>
+              <a:gd name="connsiteX0" fmla="*/ 0 w 4333582"/>
+              <a:gd name="connsiteY0" fmla="*/ 2087040 h 2088219"/>
+              <a:gd name="connsiteX1" fmla="*/ 271474 w 4333582"/>
+              <a:gd name="connsiteY1" fmla="*/ 2086199 h 2088219"/>
+              <a:gd name="connsiteX2" fmla="*/ 1569234 w 4333582"/>
+              <a:gd name="connsiteY2" fmla="*/ 1817217 h 2088219"/>
+              <a:gd name="connsiteX3" fmla="*/ 2468644 w 4333582"/>
+              <a:gd name="connsiteY3" fmla="*/ 258240 h 2088219"/>
+              <a:gd name="connsiteX4" fmla="*/ 3845631 w 4333582"/>
+              <a:gd name="connsiteY4" fmla="*/ 487 h 2088219"/>
+              <a:gd name="connsiteX5" fmla="*/ 4333582 w 4333582"/>
+              <a:gd name="connsiteY5" fmla="*/ 0 h 2088219"/>
             </a:gdLst>
             <a:ahLst/>
             <a:cxnLst>
@@ -4514,28 +5070,42 @@
               <a:cxn ang="0">
                 <a:pos x="connsiteX3" y="connsiteY3"/>
               </a:cxn>
+              <a:cxn ang="0">
+                <a:pos x="connsiteX4" y="connsiteY4"/>
+              </a:cxn>
+              <a:cxn ang="0">
+                <a:pos x="connsiteX5" y="connsiteY5"/>
+              </a:cxn>
             </a:cxnLst>
             <a:rect l="l" t="t" r="r" b="b"/>
             <a:pathLst>
-              <a:path w="3822492" h="2083632">
+              <a:path w="4333582" h="2088219">
                 <a:moveTo>
-                  <a:pt x="0" y="2083632"/>
+                  <a:pt x="0" y="2087040"/>
                 </a:moveTo>
                 <a:cubicBezTo>
-                  <a:pt x="538397" y="2066144"/>
-                  <a:pt x="986852" y="2118609"/>
-                  <a:pt x="1364104" y="1813809"/>
+                  <a:pt x="1786" y="2086900"/>
+                  <a:pt x="12832" y="2090275"/>
+                  <a:pt x="271474" y="2086199"/>
                 </a:cubicBezTo>
                 <a:cubicBezTo>
-                  <a:pt x="1741356" y="1509009"/>
-                  <a:pt x="1853783" y="557133"/>
-                  <a:pt x="2263514" y="254832"/>
+                  <a:pt x="502302" y="2082124"/>
+                  <a:pt x="1203039" y="2121877"/>
+                  <a:pt x="1569234" y="1817217"/>
                 </a:cubicBezTo>
                 <a:cubicBezTo>
-                  <a:pt x="2673245" y="-47469"/>
-                  <a:pt x="3125449" y="39975"/>
-                  <a:pt x="3822492" y="0"/>
+                  <a:pt x="1935429" y="1512557"/>
+                  <a:pt x="2067225" y="561596"/>
+                  <a:pt x="2468644" y="258240"/>
                 </a:cubicBezTo>
+                <a:cubicBezTo>
+                  <a:pt x="2800527" y="12818"/>
+                  <a:pt x="3293751" y="2063"/>
+                  <a:pt x="3845631" y="487"/>
+                </a:cubicBezTo>
+                <a:lnTo>
+                  <a:pt x="4333582" y="0"/>
+                </a:lnTo>
               </a:path>
             </a:pathLst>
           </a:custGeom>
@@ -4567,7 +5137,7 @@
           <a:lstStyle/>
           <a:p>
             <a:pPr algn="ctr"/>
-            <a:endParaRPr lang="en-US"/>
+            <a:endParaRPr lang="en-US" dirty="0"/>
           </a:p>
         </p:txBody>
       </p:sp>
@@ -4624,19 +5194,19 @@
           <a:gradFill flip="none" rotWithShape="1">
             <a:gsLst>
               <a:gs pos="0">
-                <a:srgbClr val="FFC000">
+                <a:srgbClr val="FF00FF">
                   <a:tint val="66000"/>
                   <a:satMod val="160000"/>
                 </a:srgbClr>
               </a:gs>
               <a:gs pos="50000">
-                <a:srgbClr val="FFC000">
+                <a:srgbClr val="FF00FF">
                   <a:tint val="44500"/>
                   <a:satMod val="160000"/>
                 </a:srgbClr>
               </a:gs>
               <a:gs pos="100000">
-                <a:srgbClr val="FFC000">
+                <a:srgbClr val="FF00FF">
                   <a:tint val="23500"/>
                   <a:satMod val="160000"/>
                 </a:srgbClr>
@@ -4692,8 +5262,8 @@
         </p:nvSpPr>
         <p:spPr>
           <a:xfrm>
-            <a:off x="5491353" y="1471961"/>
-            <a:ext cx="1768092" cy="3947532"/>
+            <a:off x="5480595" y="1430769"/>
+            <a:ext cx="1768092" cy="3977908"/>
           </a:xfrm>
           <a:custGeom>
             <a:avLst/>
@@ -4800,8 +5370,8 @@
         </p:nvSpPr>
         <p:spPr>
           <a:xfrm>
-            <a:off x="4268697" y="3712082"/>
-            <a:ext cx="3334216" cy="1319066"/>
+            <a:off x="4227755" y="3712082"/>
+            <a:ext cx="3375158" cy="1319066"/>
           </a:xfrm>
           <a:custGeom>
             <a:avLst/>
@@ -5025,7 +5595,7 @@
           <a:noFill/>
           <a:ln w="28575">
             <a:solidFill>
-              <a:srgbClr val="00B050"/>
+              <a:srgbClr val="0000FF"/>
             </a:solidFill>
           </a:ln>
         </p:spPr>

</xml_diff>